<commit_message>
work on grand tour
</commit_message>
<xml_diff>
--- a/images/peng-tourr-diagram.pptx
+++ b/images/peng-tourr-diagram.pptx
@@ -263,7 +263,7 @@
           <a:p>
             <a:fld id="{861DD715-3ECE-4CDC-8907-62AF172FB425}" type="datetimeFigureOut">
               <a:rPr lang="en-CA" smtClean="0"/>
-              <a:t>2024-02-07</a:t>
+              <a:t>2024-02-09</a:t>
             </a:fld>
             <a:endParaRPr lang="en-CA"/>
           </a:p>
@@ -463,7 +463,7 @@
           <a:p>
             <a:fld id="{861DD715-3ECE-4CDC-8907-62AF172FB425}" type="datetimeFigureOut">
               <a:rPr lang="en-CA" smtClean="0"/>
-              <a:t>2024-02-07</a:t>
+              <a:t>2024-02-09</a:t>
             </a:fld>
             <a:endParaRPr lang="en-CA"/>
           </a:p>
@@ -673,7 +673,7 @@
           <a:p>
             <a:fld id="{861DD715-3ECE-4CDC-8907-62AF172FB425}" type="datetimeFigureOut">
               <a:rPr lang="en-CA" smtClean="0"/>
-              <a:t>2024-02-07</a:t>
+              <a:t>2024-02-09</a:t>
             </a:fld>
             <a:endParaRPr lang="en-CA"/>
           </a:p>
@@ -873,7 +873,7 @@
           <a:p>
             <a:fld id="{861DD715-3ECE-4CDC-8907-62AF172FB425}" type="datetimeFigureOut">
               <a:rPr lang="en-CA" smtClean="0"/>
-              <a:t>2024-02-07</a:t>
+              <a:t>2024-02-09</a:t>
             </a:fld>
             <a:endParaRPr lang="en-CA"/>
           </a:p>
@@ -1149,7 +1149,7 @@
           <a:p>
             <a:fld id="{861DD715-3ECE-4CDC-8907-62AF172FB425}" type="datetimeFigureOut">
               <a:rPr lang="en-CA" smtClean="0"/>
-              <a:t>2024-02-07</a:t>
+              <a:t>2024-02-09</a:t>
             </a:fld>
             <a:endParaRPr lang="en-CA"/>
           </a:p>
@@ -1417,7 +1417,7 @@
           <a:p>
             <a:fld id="{861DD715-3ECE-4CDC-8907-62AF172FB425}" type="datetimeFigureOut">
               <a:rPr lang="en-CA" smtClean="0"/>
-              <a:t>2024-02-07</a:t>
+              <a:t>2024-02-09</a:t>
             </a:fld>
             <a:endParaRPr lang="en-CA"/>
           </a:p>
@@ -1832,7 +1832,7 @@
           <a:p>
             <a:fld id="{861DD715-3ECE-4CDC-8907-62AF172FB425}" type="datetimeFigureOut">
               <a:rPr lang="en-CA" smtClean="0"/>
-              <a:t>2024-02-07</a:t>
+              <a:t>2024-02-09</a:t>
             </a:fld>
             <a:endParaRPr lang="en-CA"/>
           </a:p>
@@ -1974,7 +1974,7 @@
           <a:p>
             <a:fld id="{861DD715-3ECE-4CDC-8907-62AF172FB425}" type="datetimeFigureOut">
               <a:rPr lang="en-CA" smtClean="0"/>
-              <a:t>2024-02-07</a:t>
+              <a:t>2024-02-09</a:t>
             </a:fld>
             <a:endParaRPr lang="en-CA"/>
           </a:p>
@@ -2087,7 +2087,7 @@
           <a:p>
             <a:fld id="{861DD715-3ECE-4CDC-8907-62AF172FB425}" type="datetimeFigureOut">
               <a:rPr lang="en-CA" smtClean="0"/>
-              <a:t>2024-02-07</a:t>
+              <a:t>2024-02-09</a:t>
             </a:fld>
             <a:endParaRPr lang="en-CA"/>
           </a:p>
@@ -2400,7 +2400,7 @@
           <a:p>
             <a:fld id="{861DD715-3ECE-4CDC-8907-62AF172FB425}" type="datetimeFigureOut">
               <a:rPr lang="en-CA" smtClean="0"/>
-              <a:t>2024-02-07</a:t>
+              <a:t>2024-02-09</a:t>
             </a:fld>
             <a:endParaRPr lang="en-CA"/>
           </a:p>
@@ -2689,7 +2689,7 @@
           <a:p>
             <a:fld id="{861DD715-3ECE-4CDC-8907-62AF172FB425}" type="datetimeFigureOut">
               <a:rPr lang="en-CA" smtClean="0"/>
-              <a:t>2024-02-07</a:t>
+              <a:t>2024-02-09</a:t>
             </a:fld>
             <a:endParaRPr lang="en-CA"/>
           </a:p>
@@ -2932,7 +2932,7 @@
           <a:p>
             <a:fld id="{861DD715-3ECE-4CDC-8907-62AF172FB425}" type="datetimeFigureOut">
               <a:rPr lang="en-CA" smtClean="0"/>
-              <a:t>2024-02-07</a:t>
+              <a:t>2024-02-09</a:t>
             </a:fld>
             <a:endParaRPr lang="en-CA"/>
           </a:p>
@@ -4668,10 +4668,10 @@
       </p:grpSpPr>
       <p:pic>
         <p:nvPicPr>
-          <p:cNvPr id="3" name="Picture 2" descr="A diagram of a cube with balls&#10;&#10;Description automatically generated">
-            <a:extLst>
-              <a:ext uri="{FF2B5EF4-FFF2-40B4-BE49-F238E27FC236}">
-                <a16:creationId xmlns:a16="http://schemas.microsoft.com/office/drawing/2014/main" id="{5D76EBC8-8962-6A39-AAE5-B6E833D76D7E}"/>
+          <p:cNvPr id="5" name="Picture 4" descr="A graph of a number of triangles&#10;&#10;Description automatically generated with medium confidence">
+            <a:extLst>
+              <a:ext uri="{FF2B5EF4-FFF2-40B4-BE49-F238E27FC236}">
+                <a16:creationId xmlns:a16="http://schemas.microsoft.com/office/drawing/2014/main" id="{F36234A4-5B0F-ACFC-6AF4-F1FF67407DB0}"/>
               </a:ext>
             </a:extLst>
           </p:cNvPr>
@@ -4682,42 +4682,6 @@
         </p:nvPicPr>
         <p:blipFill>
           <a:blip r:embed="rId2">
-            <a:extLst>
-              <a:ext uri="{28A0092B-C50C-407E-A947-70E740481C1C}">
-                <a14:useLocalDpi xmlns:a14="http://schemas.microsoft.com/office/drawing/2010/main" val="0"/>
-              </a:ext>
-            </a:extLst>
-          </a:blip>
-          <a:stretch>
-            <a:fillRect/>
-          </a:stretch>
-        </p:blipFill>
-        <p:spPr>
-          <a:xfrm>
-            <a:off x="439760" y="1386536"/>
-            <a:ext cx="3980952" cy="3980952"/>
-          </a:xfrm>
-          <a:prstGeom prst="rect">
-            <a:avLst/>
-          </a:prstGeom>
-        </p:spPr>
-      </p:pic>
-      <p:pic>
-        <p:nvPicPr>
-          <p:cNvPr id="5" name="Picture 4" descr="A graph of a number of triangles&#10;&#10;Description automatically generated with medium confidence">
-            <a:extLst>
-              <a:ext uri="{FF2B5EF4-FFF2-40B4-BE49-F238E27FC236}">
-                <a16:creationId xmlns:a16="http://schemas.microsoft.com/office/drawing/2014/main" id="{F36234A4-5B0F-ACFC-6AF4-F1FF67407DB0}"/>
-              </a:ext>
-            </a:extLst>
-          </p:cNvPr>
-          <p:cNvPicPr>
-            <a:picLocks noChangeAspect="1"/>
-          </p:cNvPicPr>
-          <p:nvPr/>
-        </p:nvPicPr>
-        <p:blipFill>
-          <a:blip r:embed="rId3">
             <a:extLst>
               <a:ext uri="{28A0092B-C50C-407E-A947-70E740481C1C}">
                 <a14:useLocalDpi xmlns:a14="http://schemas.microsoft.com/office/drawing/2010/main" val="0"/>
@@ -4753,7 +4717,7 @@
           <p:nvPr/>
         </p:nvPicPr>
         <p:blipFill>
-          <a:blip r:embed="rId4">
+          <a:blip r:embed="rId3">
             <a:extLst>
               <a:ext uri="{28A0092B-C50C-407E-A947-70E740481C1C}">
                 <a14:useLocalDpi xmlns:a14="http://schemas.microsoft.com/office/drawing/2010/main" val="0"/>
@@ -4882,6 +4846,42 @@
           </a:p>
         </p:txBody>
       </p:sp>
+      <p:pic>
+        <p:nvPicPr>
+          <p:cNvPr id="4" name="Picture 3" descr="A diagram of a cube with different colored squares&#10;&#10;Description automatically generated">
+            <a:extLst>
+              <a:ext uri="{FF2B5EF4-FFF2-40B4-BE49-F238E27FC236}">
+                <a16:creationId xmlns:a16="http://schemas.microsoft.com/office/drawing/2014/main" id="{D163EF17-C7B9-2539-5B2A-9A972E88A6CE}"/>
+              </a:ext>
+            </a:extLst>
+          </p:cNvPr>
+          <p:cNvPicPr>
+            <a:picLocks noChangeAspect="1"/>
+          </p:cNvPicPr>
+          <p:nvPr/>
+        </p:nvPicPr>
+        <p:blipFill>
+          <a:blip r:embed="rId4">
+            <a:extLst>
+              <a:ext uri="{28A0092B-C50C-407E-A947-70E740481C1C}">
+                <a14:useLocalDpi xmlns:a14="http://schemas.microsoft.com/office/drawing/2010/main" val="0"/>
+              </a:ext>
+            </a:extLst>
+          </a:blip>
+          <a:stretch>
+            <a:fillRect/>
+          </a:stretch>
+        </p:blipFill>
+        <p:spPr>
+          <a:xfrm>
+            <a:off x="438912" y="1389888"/>
+            <a:ext cx="3977640" cy="3977640"/>
+          </a:xfrm>
+          <a:prstGeom prst="rect">
+            <a:avLst/>
+          </a:prstGeom>
+        </p:spPr>
+      </p:pic>
     </p:spTree>
     <p:extLst>
       <p:ext uri="{BB962C8B-B14F-4D97-AF65-F5344CB8AC3E}">

</xml_diff>